<commit_message>
Siste oppdateringer i presentasjonen før workshop.
</commit_message>
<xml_diff>
--- a/API-workshop.pptx
+++ b/API-workshop.pptx
@@ -278,7 +278,7 @@
           <a:p>
             <a:fld id="{1DDD8A0A-DB3C-9D49-91EF-A9F6E9FDE0AC}" type="datetimeFigureOut">
               <a:rPr lang="nb-NO" smtClean="0"/>
-              <a:t>08.12.2022</a:t>
+              <a:t>02.01.2023</a:t>
             </a:fld>
             <a:endParaRPr lang="nb-NO"/>
           </a:p>
@@ -476,7 +476,7 @@
           <a:p>
             <a:fld id="{1DDD8A0A-DB3C-9D49-91EF-A9F6E9FDE0AC}" type="datetimeFigureOut">
               <a:rPr lang="nb-NO" smtClean="0"/>
-              <a:t>08.12.2022</a:t>
+              <a:t>02.01.2023</a:t>
             </a:fld>
             <a:endParaRPr lang="nb-NO"/>
           </a:p>
@@ -684,7 +684,7 @@
           <a:p>
             <a:fld id="{1DDD8A0A-DB3C-9D49-91EF-A9F6E9FDE0AC}" type="datetimeFigureOut">
               <a:rPr lang="nb-NO" smtClean="0"/>
-              <a:t>08.12.2022</a:t>
+              <a:t>02.01.2023</a:t>
             </a:fld>
             <a:endParaRPr lang="nb-NO"/>
           </a:p>
@@ -882,7 +882,7 @@
           <a:p>
             <a:fld id="{1DDD8A0A-DB3C-9D49-91EF-A9F6E9FDE0AC}" type="datetimeFigureOut">
               <a:rPr lang="nb-NO" smtClean="0"/>
-              <a:t>08.12.2022</a:t>
+              <a:t>02.01.2023</a:t>
             </a:fld>
             <a:endParaRPr lang="nb-NO"/>
           </a:p>
@@ -1157,7 +1157,7 @@
           <a:p>
             <a:fld id="{1DDD8A0A-DB3C-9D49-91EF-A9F6E9FDE0AC}" type="datetimeFigureOut">
               <a:rPr lang="nb-NO" smtClean="0"/>
-              <a:t>08.12.2022</a:t>
+              <a:t>02.01.2023</a:t>
             </a:fld>
             <a:endParaRPr lang="nb-NO"/>
           </a:p>
@@ -1422,7 +1422,7 @@
           <a:p>
             <a:fld id="{1DDD8A0A-DB3C-9D49-91EF-A9F6E9FDE0AC}" type="datetimeFigureOut">
               <a:rPr lang="nb-NO" smtClean="0"/>
-              <a:t>08.12.2022</a:t>
+              <a:t>02.01.2023</a:t>
             </a:fld>
             <a:endParaRPr lang="nb-NO"/>
           </a:p>
@@ -1834,7 +1834,7 @@
           <a:p>
             <a:fld id="{1DDD8A0A-DB3C-9D49-91EF-A9F6E9FDE0AC}" type="datetimeFigureOut">
               <a:rPr lang="nb-NO" smtClean="0"/>
-              <a:t>08.12.2022</a:t>
+              <a:t>02.01.2023</a:t>
             </a:fld>
             <a:endParaRPr lang="nb-NO"/>
           </a:p>
@@ -1975,7 +1975,7 @@
           <a:p>
             <a:fld id="{1DDD8A0A-DB3C-9D49-91EF-A9F6E9FDE0AC}" type="datetimeFigureOut">
               <a:rPr lang="nb-NO" smtClean="0"/>
-              <a:t>08.12.2022</a:t>
+              <a:t>02.01.2023</a:t>
             </a:fld>
             <a:endParaRPr lang="nb-NO"/>
           </a:p>
@@ -2088,7 +2088,7 @@
           <a:p>
             <a:fld id="{1DDD8A0A-DB3C-9D49-91EF-A9F6E9FDE0AC}" type="datetimeFigureOut">
               <a:rPr lang="nb-NO" smtClean="0"/>
-              <a:t>08.12.2022</a:t>
+              <a:t>02.01.2023</a:t>
             </a:fld>
             <a:endParaRPr lang="nb-NO"/>
           </a:p>
@@ -2399,7 +2399,7 @@
           <a:p>
             <a:fld id="{1DDD8A0A-DB3C-9D49-91EF-A9F6E9FDE0AC}" type="datetimeFigureOut">
               <a:rPr lang="nb-NO" smtClean="0"/>
-              <a:t>08.12.2022</a:t>
+              <a:t>02.01.2023</a:t>
             </a:fld>
             <a:endParaRPr lang="nb-NO"/>
           </a:p>
@@ -2687,7 +2687,7 @@
           <a:p>
             <a:fld id="{1DDD8A0A-DB3C-9D49-91EF-A9F6E9FDE0AC}" type="datetimeFigureOut">
               <a:rPr lang="nb-NO" smtClean="0"/>
-              <a:t>08.12.2022</a:t>
+              <a:t>02.01.2023</a:t>
             </a:fld>
             <a:endParaRPr lang="nb-NO"/>
           </a:p>
@@ -2928,7 +2928,7 @@
           <a:p>
             <a:fld id="{1DDD8A0A-DB3C-9D49-91EF-A9F6E9FDE0AC}" type="datetimeFigureOut">
               <a:rPr lang="nb-NO" smtClean="0"/>
-              <a:t>08.12.2022</a:t>
+              <a:t>02.01.2023</a:t>
             </a:fld>
             <a:endParaRPr lang="nb-NO"/>
           </a:p>
@@ -4062,7 +4062,7 @@
             <a:pPr lvl="1"/>
             <a:r>
               <a:rPr lang="nb-NO" dirty="0"/>
-              <a:t>Bruker 1 fjerner noe som var feil i teksten, men lagrer uten å legge inn det korrekt. Brevteksten er dermed ikke klar til å sendes. </a:t>
+              <a:t>Bruker 1 fjerner noe som var feil i teksten, men lagrer uten å legge inn det korrekte. Brevteksten er dermed ikke klar til å sendes. </a:t>
             </a:r>
           </a:p>
           <a:p>
@@ -5657,7 +5657,7 @@
             <a:pPr lvl="1"/>
             <a:r>
               <a:rPr lang="nb-NO" dirty="0"/>
-              <a:t>Våre ressurser er normalt entiteter</a:t>
+              <a:t>Ressurser er vanligvis entiteter som persisteres</a:t>
             </a:r>
           </a:p>
           <a:p>
@@ -6279,7 +6279,7 @@
           <a:p>
             <a:r>
               <a:rPr lang="nb-NO" dirty="0"/>
-              <a:t>Endre enkel-felter på en spesifikk entitet</a:t>
+              <a:t>Endre enkelt-felter på en spesifikk entitet</a:t>
             </a:r>
           </a:p>
           <a:p>

</xml_diff>

<commit_message>
Retter feil i presentasjonen
</commit_message>
<xml_diff>
--- a/API-workshop.pptx
+++ b/API-workshop.pptx
@@ -278,7 +278,7 @@
           <a:p>
             <a:fld id="{1DDD8A0A-DB3C-9D49-91EF-A9F6E9FDE0AC}" type="datetimeFigureOut">
               <a:rPr lang="nb-NO" smtClean="0"/>
-              <a:t>02.01.2023</a:t>
+              <a:t>04.01.2023</a:t>
             </a:fld>
             <a:endParaRPr lang="nb-NO"/>
           </a:p>
@@ -476,7 +476,7 @@
           <a:p>
             <a:fld id="{1DDD8A0A-DB3C-9D49-91EF-A9F6E9FDE0AC}" type="datetimeFigureOut">
               <a:rPr lang="nb-NO" smtClean="0"/>
-              <a:t>02.01.2023</a:t>
+              <a:t>04.01.2023</a:t>
             </a:fld>
             <a:endParaRPr lang="nb-NO"/>
           </a:p>
@@ -684,7 +684,7 @@
           <a:p>
             <a:fld id="{1DDD8A0A-DB3C-9D49-91EF-A9F6E9FDE0AC}" type="datetimeFigureOut">
               <a:rPr lang="nb-NO" smtClean="0"/>
-              <a:t>02.01.2023</a:t>
+              <a:t>04.01.2023</a:t>
             </a:fld>
             <a:endParaRPr lang="nb-NO"/>
           </a:p>
@@ -882,7 +882,7 @@
           <a:p>
             <a:fld id="{1DDD8A0A-DB3C-9D49-91EF-A9F6E9FDE0AC}" type="datetimeFigureOut">
               <a:rPr lang="nb-NO" smtClean="0"/>
-              <a:t>02.01.2023</a:t>
+              <a:t>04.01.2023</a:t>
             </a:fld>
             <a:endParaRPr lang="nb-NO"/>
           </a:p>
@@ -1157,7 +1157,7 @@
           <a:p>
             <a:fld id="{1DDD8A0A-DB3C-9D49-91EF-A9F6E9FDE0AC}" type="datetimeFigureOut">
               <a:rPr lang="nb-NO" smtClean="0"/>
-              <a:t>02.01.2023</a:t>
+              <a:t>04.01.2023</a:t>
             </a:fld>
             <a:endParaRPr lang="nb-NO"/>
           </a:p>
@@ -1422,7 +1422,7 @@
           <a:p>
             <a:fld id="{1DDD8A0A-DB3C-9D49-91EF-A9F6E9FDE0AC}" type="datetimeFigureOut">
               <a:rPr lang="nb-NO" smtClean="0"/>
-              <a:t>02.01.2023</a:t>
+              <a:t>04.01.2023</a:t>
             </a:fld>
             <a:endParaRPr lang="nb-NO"/>
           </a:p>
@@ -1834,7 +1834,7 @@
           <a:p>
             <a:fld id="{1DDD8A0A-DB3C-9D49-91EF-A9F6E9FDE0AC}" type="datetimeFigureOut">
               <a:rPr lang="nb-NO" smtClean="0"/>
-              <a:t>02.01.2023</a:t>
+              <a:t>04.01.2023</a:t>
             </a:fld>
             <a:endParaRPr lang="nb-NO"/>
           </a:p>
@@ -1975,7 +1975,7 @@
           <a:p>
             <a:fld id="{1DDD8A0A-DB3C-9D49-91EF-A9F6E9FDE0AC}" type="datetimeFigureOut">
               <a:rPr lang="nb-NO" smtClean="0"/>
-              <a:t>02.01.2023</a:t>
+              <a:t>04.01.2023</a:t>
             </a:fld>
             <a:endParaRPr lang="nb-NO"/>
           </a:p>
@@ -2088,7 +2088,7 @@
           <a:p>
             <a:fld id="{1DDD8A0A-DB3C-9D49-91EF-A9F6E9FDE0AC}" type="datetimeFigureOut">
               <a:rPr lang="nb-NO" smtClean="0"/>
-              <a:t>02.01.2023</a:t>
+              <a:t>04.01.2023</a:t>
             </a:fld>
             <a:endParaRPr lang="nb-NO"/>
           </a:p>
@@ -2399,7 +2399,7 @@
           <a:p>
             <a:fld id="{1DDD8A0A-DB3C-9D49-91EF-A9F6E9FDE0AC}" type="datetimeFigureOut">
               <a:rPr lang="nb-NO" smtClean="0"/>
-              <a:t>02.01.2023</a:t>
+              <a:t>04.01.2023</a:t>
             </a:fld>
             <a:endParaRPr lang="nb-NO"/>
           </a:p>
@@ -2687,7 +2687,7 @@
           <a:p>
             <a:fld id="{1DDD8A0A-DB3C-9D49-91EF-A9F6E9FDE0AC}" type="datetimeFigureOut">
               <a:rPr lang="nb-NO" smtClean="0"/>
-              <a:t>02.01.2023</a:t>
+              <a:t>04.01.2023</a:t>
             </a:fld>
             <a:endParaRPr lang="nb-NO"/>
           </a:p>
@@ -2928,7 +2928,7 @@
           <a:p>
             <a:fld id="{1DDD8A0A-DB3C-9D49-91EF-A9F6E9FDE0AC}" type="datetimeFigureOut">
               <a:rPr lang="nb-NO" smtClean="0"/>
-              <a:t>02.01.2023</a:t>
+              <a:t>04.01.2023</a:t>
             </a:fld>
             <a:endParaRPr lang="nb-NO"/>
           </a:p>
@@ -3561,14 +3561,14 @@
             <a:pPr lvl="1"/>
             <a:r>
               <a:rPr lang="nb-NO" dirty="0"/>
-              <a:t>Statuskode 200</a:t>
-            </a:r>
-          </a:p>
-          <a:p>
-            <a:pPr lvl="1"/>
-            <a:r>
-              <a:rPr lang="nb-NO" dirty="0"/>
-              <a:t>Oppdatert entitet i body (valgfritt)</a:t>
+              <a:t>Statuskode 204 og ingen body</a:t>
+            </a:r>
+          </a:p>
+          <a:p>
+            <a:pPr lvl="1"/>
+            <a:r>
+              <a:rPr lang="nb-NO" dirty="0"/>
+              <a:t>... eller statuskode 200 og oppdatert entitet i body</a:t>
             </a:r>
           </a:p>
         </p:txBody>
@@ -6273,7 +6273,7 @@
         <p:spPr/>
         <p:txBody>
           <a:bodyPr>
-            <a:normAutofit lnSpcReduction="10000"/>
+            <a:normAutofit fontScale="92500" lnSpcReduction="10000"/>
           </a:bodyPr>
           <a:lstStyle/>
           <a:p>
@@ -6359,14 +6359,14 @@
             <a:pPr lvl="1"/>
             <a:r>
               <a:rPr lang="nb-NO" dirty="0"/>
-              <a:t>Statuskode 204</a:t>
-            </a:r>
-          </a:p>
-          <a:p>
-            <a:pPr lvl="1"/>
-            <a:r>
-              <a:rPr lang="nb-NO" dirty="0"/>
-              <a:t>Oppdatert entitet i body (valgfritt)</a:t>
+              <a:t>Statuskode 204 og ingen body</a:t>
+            </a:r>
+          </a:p>
+          <a:p>
+            <a:pPr lvl="1"/>
+            <a:r>
+              <a:rPr lang="nb-NO" dirty="0"/>
+              <a:t>... eller statuskode 200 og oppdatert entitet i body</a:t>
             </a:r>
           </a:p>
           <a:p>

</xml_diff>